<commit_message>
GitHub action artefacts added
</commit_message>
<xml_diff>
--- a/presentation/presentation.pptx
+++ b/presentation/presentation.pptx
@@ -3899,57 +3899,41 @@
           </a:p>
         </p:txBody>
       </p:sp>
-      <p:pic>
-        <p:nvPicPr>
-          <p:cNvPr descr="fig:  images/Eleanor_Roosevelt_and_Human_Rights_Declaration.jpeg" id="0" name="Picture 1"/>
-          <p:cNvPicPr>
-            <a:picLocks noGrp="1" noChangeAspect="1"/>
-          </p:cNvPicPr>
-          <p:nvPr/>
-        </p:nvPicPr>
-        <p:blipFill>
-          <a:blip r:embed="rId2"/>
-          <a:stretch>
-            <a:fillRect/>
-          </a:stretch>
-        </p:blipFill>
-        <p:spPr bwMode="auto">
-          <a:xfrm>
-            <a:off x="2667000" y="1193800"/>
-            <a:ext cx="3810000" cy="2882900"/>
-          </a:xfrm>
-          <a:prstGeom prst="rect">
-            <a:avLst/>
-          </a:prstGeom>
-          <a:noFill/>
-          <a:ln w="9525">
-            <a:noFill/>
-            <a:headEnd/>
-            <a:tailEnd/>
-          </a:ln>
-        </p:spPr>
-      </p:pic>
-      <p:sp>
-        <p:nvSpPr>
-          <p:cNvPr id="1" name="TextBox 3"/>
-          <p:cNvSpPr txBox="1"/>
-          <p:nvPr/>
-        </p:nvSpPr>
-        <p:spPr>
-          <a:xfrm>
-            <a:off x="457200" y="4076700"/>
-            <a:ext cx="8229600" cy="508000"/>
-          </a:xfrm>
-          <a:prstGeom prst="rect">
-            <a:avLst/>
-          </a:prstGeom>
-          <a:noFill/>
-        </p:spPr>
-        <p:txBody>
-          <a:bodyPr/>
-          <a:lstStyle/>
-          <a:p>
-            <a:pPr lvl="0" indent="0" marL="0" algn="ctr">
+      <p:sp>
+        <p:nvSpPr>
+          <p:cNvPr id="3" name="Content Placeholder 2"/>
+          <p:cNvSpPr>
+            <a:spLocks noGrp="1"/>
+          </p:cNvSpPr>
+          <p:nvPr>
+            <p:ph idx="1"/>
+          </p:nvPr>
+        </p:nvSpPr>
+        <p:spPr/>
+        <p:txBody>
+          <a:bodyPr/>
+          <a:lstStyle/>
+          <a:p>
+            <a:pPr lvl="0" indent="0" marL="0">
+              <a:buNone/>
+            </a:pPr>
+            <a:r>
+              <a:rPr/>
+              <a:t>Eleanor Roosevelt hält die englische Version der Allgemeinen Erklärung der Menschenrechte (FDR Presidential Library &amp; Museum, CC BY 2.0 </a:t>
+            </a:r>
+            <a:r>
+              <a:rPr>
+                <a:hlinkClick r:id="rId2"/>
+              </a:rPr>
+              <a:t>https://creativecommons.org/licenses/by/2.0</a:t>
+            </a:r>
+            <a:r>
+              <a:rPr/>
+              <a:t>, via Wikimedia Commons)</a:t>
+            </a:r>
+          </a:p>
+          <a:p>
+            <a:pPr lvl="0" indent="0" marL="0">
               <a:buNone/>
             </a:pPr>
             <a:r>

</xml_diff>

<commit_message>
fix: Update pandoc and pandoc-crossref (#33)
* fix(pandoc.yml): Update pandoc and pandoc-crossref
* fix(thesis): typos and cross-ref fixed
</commit_message>
<xml_diff>
--- a/presentation/presentation.pptx
+++ b/presentation/presentation.pptx
@@ -3899,57 +3899,41 @@
           </a:p>
         </p:txBody>
       </p:sp>
-      <p:pic>
-        <p:nvPicPr>
-          <p:cNvPr descr="fig:  images/Eleanor_Roosevelt_and_Human_Rights_Declaration.jpeg" id="0" name="Picture 1"/>
-          <p:cNvPicPr>
-            <a:picLocks noGrp="1" noChangeAspect="1"/>
-          </p:cNvPicPr>
-          <p:nvPr/>
-        </p:nvPicPr>
-        <p:blipFill>
-          <a:blip r:embed="rId2"/>
-          <a:stretch>
-            <a:fillRect/>
-          </a:stretch>
-        </p:blipFill>
-        <p:spPr bwMode="auto">
-          <a:xfrm>
-            <a:off x="2667000" y="1193800"/>
-            <a:ext cx="3810000" cy="2882900"/>
-          </a:xfrm>
-          <a:prstGeom prst="rect">
-            <a:avLst/>
-          </a:prstGeom>
-          <a:noFill/>
-          <a:ln w="9525">
-            <a:noFill/>
-            <a:headEnd/>
-            <a:tailEnd/>
-          </a:ln>
-        </p:spPr>
-      </p:pic>
-      <p:sp>
-        <p:nvSpPr>
-          <p:cNvPr id="1" name="TextBox 3"/>
-          <p:cNvSpPr txBox="1"/>
-          <p:nvPr/>
-        </p:nvSpPr>
-        <p:spPr>
-          <a:xfrm>
-            <a:off x="457200" y="4076700"/>
-            <a:ext cx="8229600" cy="508000"/>
-          </a:xfrm>
-          <a:prstGeom prst="rect">
-            <a:avLst/>
-          </a:prstGeom>
-          <a:noFill/>
-        </p:spPr>
-        <p:txBody>
-          <a:bodyPr/>
-          <a:lstStyle/>
-          <a:p>
-            <a:pPr lvl="0" indent="0" marL="0" algn="ctr">
+      <p:sp>
+        <p:nvSpPr>
+          <p:cNvPr id="3" name="Content Placeholder 2"/>
+          <p:cNvSpPr>
+            <a:spLocks noGrp="1"/>
+          </p:cNvSpPr>
+          <p:nvPr>
+            <p:ph idx="1"/>
+          </p:nvPr>
+        </p:nvSpPr>
+        <p:spPr/>
+        <p:txBody>
+          <a:bodyPr/>
+          <a:lstStyle/>
+          <a:p>
+            <a:pPr lvl="0" indent="0" marL="0">
+              <a:buNone/>
+            </a:pPr>
+            <a:r>
+              <a:rPr/>
+              <a:t>Eleanor Roosevelt hält die englische Version der Allgemeinen Erklärung der Menschenrechte (FDR Presidential Library &amp; Museum, CC BY 2.0 </a:t>
+            </a:r>
+            <a:r>
+              <a:rPr>
+                <a:hlinkClick r:id="rId2"/>
+              </a:rPr>
+              <a:t>https://creativecommons.org/licenses/by/2.0</a:t>
+            </a:r>
+            <a:r>
+              <a:rPr/>
+              <a:t>, via Wikimedia Commons)</a:t>
+            </a:r>
+          </a:p>
+          <a:p>
+            <a:pPr lvl="0" indent="0" marL="0">
               <a:buNone/>
             </a:pPr>
             <a:r>

</xml_diff>

<commit_message>
fix: rerun `make all` with pandoc 3.1.2
</commit_message>
<xml_diff>
--- a/presentation/presentation.pptx
+++ b/presentation/presentation.pptx
@@ -3899,41 +3899,57 @@
           </a:p>
         </p:txBody>
       </p:sp>
-      <p:sp>
-        <p:nvSpPr>
-          <p:cNvPr id="3" name="Content Placeholder 2"/>
-          <p:cNvSpPr>
-            <a:spLocks noGrp="1"/>
-          </p:cNvSpPr>
-          <p:nvPr>
-            <p:ph idx="1"/>
-          </p:nvPr>
-        </p:nvSpPr>
-        <p:spPr/>
-        <p:txBody>
-          <a:bodyPr/>
-          <a:lstStyle/>
-          <a:p>
-            <a:pPr lvl="0" indent="0" marL="0">
-              <a:buNone/>
-            </a:pPr>
-            <a:r>
-              <a:rPr/>
-              <a:t>Eleanor Roosevelt hält die englische Version der Allgemeinen Erklärung der Menschenrechte (FDR Presidential Library &amp; Museum, CC BY 2.0 </a:t>
-            </a:r>
-            <a:r>
-              <a:rPr>
-                <a:hlinkClick r:id="rId2"/>
-              </a:rPr>
-              <a:t>https://creativecommons.org/licenses/by/2.0</a:t>
-            </a:r>
-            <a:r>
-              <a:rPr/>
-              <a:t>, via Wikimedia Commons)</a:t>
-            </a:r>
-          </a:p>
-          <a:p>
-            <a:pPr lvl="0" indent="0" marL="0">
+      <p:pic>
+        <p:nvPicPr>
+          <p:cNvPr descr="images/Eleanor_Roosevelt_and_Human_Rights_Declaration.jpeg" id="0" name="Picture 1"/>
+          <p:cNvPicPr>
+            <a:picLocks noGrp="1" noChangeAspect="1"/>
+          </p:cNvPicPr>
+          <p:nvPr/>
+        </p:nvPicPr>
+        <p:blipFill>
+          <a:blip r:embed="rId2"/>
+          <a:stretch>
+            <a:fillRect/>
+          </a:stretch>
+        </p:blipFill>
+        <p:spPr bwMode="auto">
+          <a:xfrm>
+            <a:off x="2667000" y="1193800"/>
+            <a:ext cx="3810000" cy="2882900"/>
+          </a:xfrm>
+          <a:prstGeom prst="rect">
+            <a:avLst/>
+          </a:prstGeom>
+          <a:noFill/>
+          <a:ln w="9525">
+            <a:noFill/>
+            <a:headEnd/>
+            <a:tailEnd/>
+          </a:ln>
+        </p:spPr>
+      </p:pic>
+      <p:sp>
+        <p:nvSpPr>
+          <p:cNvPr id="1" name="TextBox 3"/>
+          <p:cNvSpPr txBox="1"/>
+          <p:nvPr/>
+        </p:nvSpPr>
+        <p:spPr>
+          <a:xfrm>
+            <a:off x="457200" y="4076700"/>
+            <a:ext cx="8229600" cy="508000"/>
+          </a:xfrm>
+          <a:prstGeom prst="rect">
+            <a:avLst/>
+          </a:prstGeom>
+          <a:noFill/>
+        </p:spPr>
+        <p:txBody>
+          <a:bodyPr/>
+          <a:lstStyle/>
+          <a:p>
+            <a:pPr lvl="0" indent="0" marL="0" algn="ctr">
               <a:buNone/>
             </a:pPr>
             <a:r>

</xml_diff>

<commit_message>
feat: update pandoc 3.1 and bump to v1.0.0 (#35)
* fix(pandoc.yml): Update pandoc and pandoc-crossref
* GitHub action artefacts added
* fix(thesis): typos and cross-ref fixed
* fix: rerun `make all` with pandoc 3.1.2
* fix: enhanced docs
* ci: Changelog improved
* docs: Changelog updated
</commit_message>
<xml_diff>
--- a/presentation/presentation.pptx
+++ b/presentation/presentation.pptx
@@ -3899,41 +3899,57 @@
           </a:p>
         </p:txBody>
       </p:sp>
-      <p:sp>
-        <p:nvSpPr>
-          <p:cNvPr id="3" name="Content Placeholder 2"/>
-          <p:cNvSpPr>
-            <a:spLocks noGrp="1"/>
-          </p:cNvSpPr>
-          <p:nvPr>
-            <p:ph idx="1"/>
-          </p:nvPr>
-        </p:nvSpPr>
-        <p:spPr/>
-        <p:txBody>
-          <a:bodyPr/>
-          <a:lstStyle/>
-          <a:p>
-            <a:pPr lvl="0" indent="0" marL="0">
-              <a:buNone/>
-            </a:pPr>
-            <a:r>
-              <a:rPr/>
-              <a:t>Eleanor Roosevelt hält die englische Version der Allgemeinen Erklärung der Menschenrechte (FDR Presidential Library &amp; Museum, CC BY 2.0 </a:t>
-            </a:r>
-            <a:r>
-              <a:rPr>
-                <a:hlinkClick r:id="rId2"/>
-              </a:rPr>
-              <a:t>https://creativecommons.org/licenses/by/2.0</a:t>
-            </a:r>
-            <a:r>
-              <a:rPr/>
-              <a:t>, via Wikimedia Commons)</a:t>
-            </a:r>
-          </a:p>
-          <a:p>
-            <a:pPr lvl="0" indent="0" marL="0">
+      <p:pic>
+        <p:nvPicPr>
+          <p:cNvPr descr="images/Eleanor_Roosevelt_and_Human_Rights_Declaration.jpeg" id="0" name="Picture 1"/>
+          <p:cNvPicPr>
+            <a:picLocks noGrp="1" noChangeAspect="1"/>
+          </p:cNvPicPr>
+          <p:nvPr/>
+        </p:nvPicPr>
+        <p:blipFill>
+          <a:blip r:embed="rId2"/>
+          <a:stretch>
+            <a:fillRect/>
+          </a:stretch>
+        </p:blipFill>
+        <p:spPr bwMode="auto">
+          <a:xfrm>
+            <a:off x="2667000" y="1193800"/>
+            <a:ext cx="3810000" cy="2882900"/>
+          </a:xfrm>
+          <a:prstGeom prst="rect">
+            <a:avLst/>
+          </a:prstGeom>
+          <a:noFill/>
+          <a:ln w="9525">
+            <a:noFill/>
+            <a:headEnd/>
+            <a:tailEnd/>
+          </a:ln>
+        </p:spPr>
+      </p:pic>
+      <p:sp>
+        <p:nvSpPr>
+          <p:cNvPr id="1" name="TextBox 3"/>
+          <p:cNvSpPr txBox="1"/>
+          <p:nvPr/>
+        </p:nvSpPr>
+        <p:spPr>
+          <a:xfrm>
+            <a:off x="457200" y="4076700"/>
+            <a:ext cx="8229600" cy="508000"/>
+          </a:xfrm>
+          <a:prstGeom prst="rect">
+            <a:avLst/>
+          </a:prstGeom>
+          <a:noFill/>
+        </p:spPr>
+        <p:txBody>
+          <a:bodyPr/>
+          <a:lstStyle/>
+          <a:p>
+            <a:pPr lvl="0" indent="0" marL="0" algn="ctr">
               <a:buNone/>
             </a:pPr>
             <a:r>

</xml_diff>